<commit_message>
Added base Umbraco project with new controller to handle auto-mapping doctype to POCO.
</commit_message>
<xml_diff>
--- a/HotTowelSPAWithSEO/Canopy view of SPAs.pptx
+++ b/HotTowelSPAWithSEO/Canopy view of SPAs.pptx
@@ -5134,394 +5134,6 @@
       <dsp:cNvGrpSpPr/>
     </dsp:nvGrpSpPr>
     <dsp:grpSpPr/>
-    <dsp:sp modelId="{53913FA0-0201-467F-A8B1-E435F74F870C}">
-      <dsp:nvSpPr>
-        <dsp:cNvPr id="0" name=""/>
-        <dsp:cNvSpPr/>
-      </dsp:nvSpPr>
-      <dsp:spPr>
-        <a:xfrm>
-          <a:off x="0" y="0"/>
-          <a:ext cx="5470525" cy="1467802"/>
-        </a:xfrm>
-        <a:prstGeom prst="rect">
-          <a:avLst/>
-        </a:prstGeom>
-        <a:solidFill>
-          <a:schemeClr val="accent1">
-            <a:shade val="80000"/>
-            <a:hueOff val="0"/>
-            <a:satOff val="0"/>
-            <a:lumOff val="0"/>
-            <a:alphaOff val="0"/>
-          </a:schemeClr>
-        </a:solidFill>
-        <a:ln>
-          <a:noFill/>
-        </a:ln>
-        <a:effectLst/>
-      </dsp:spPr>
-      <dsp:style>
-        <a:lnRef idx="0">
-          <a:scrgbClr r="0" g="0" b="0"/>
-        </a:lnRef>
-        <a:fillRef idx="1">
-          <a:scrgbClr r="0" g="0" b="0"/>
-        </a:fillRef>
-        <a:effectRef idx="0">
-          <a:scrgbClr r="0" g="0" b="0"/>
-        </a:effectRef>
-        <a:fontRef idx="minor"/>
-      </dsp:style>
-      <dsp:txBody>
-        <a:bodyPr spcFirstLastPara="0" vert="horz" wrap="square" lIns="247650" tIns="247650" rIns="247650" bIns="247650" numCol="1" spcCol="1270" anchor="ctr" anchorCtr="0">
-          <a:noAutofit/>
-        </a:bodyPr>
-        <a:lstStyle/>
-        <a:p>
-          <a:pPr lvl="0" algn="ctr" defTabSz="2889250">
-            <a:lnSpc>
-              <a:spcPct val="90000"/>
-            </a:lnSpc>
-            <a:spcBef>
-              <a:spcPct val="0"/>
-            </a:spcBef>
-            <a:spcAft>
-              <a:spcPct val="35000"/>
-            </a:spcAft>
-          </a:pPr>
-          <a:r>
-            <a:rPr lang="en-GB" sz="6500" kern="1200" dirty="0" err="1" smtClean="0"/>
-            <a:t>Viewmodel</a:t>
-          </a:r>
-          <a:endParaRPr lang="en-GB" sz="6500" kern="1200" dirty="0"/>
-        </a:p>
-      </dsp:txBody>
-      <dsp:txXfrm>
-        <a:off x="0" y="0"/>
-        <a:ext cx="5470525" cy="1467802"/>
-      </dsp:txXfrm>
-    </dsp:sp>
-    <dsp:sp modelId="{7F600215-281D-4E32-B411-0401B722F918}">
-      <dsp:nvSpPr>
-        <dsp:cNvPr id="0" name=""/>
-        <dsp:cNvSpPr/>
-      </dsp:nvSpPr>
-      <dsp:spPr>
-        <a:xfrm>
-          <a:off x="2671" y="1467802"/>
-          <a:ext cx="1821727" cy="3082385"/>
-        </a:xfrm>
-        <a:prstGeom prst="rect">
-          <a:avLst/>
-        </a:prstGeom>
-        <a:solidFill>
-          <a:schemeClr val="accent1">
-            <a:hueOff val="0"/>
-            <a:satOff val="0"/>
-            <a:lumOff val="0"/>
-            <a:alphaOff val="0"/>
-          </a:schemeClr>
-        </a:solidFill>
-        <a:ln w="15875" cap="flat" cmpd="sng" algn="ctr">
-          <a:solidFill>
-            <a:schemeClr val="lt1">
-              <a:hueOff val="0"/>
-              <a:satOff val="0"/>
-              <a:lumOff val="0"/>
-              <a:alphaOff val="0"/>
-            </a:schemeClr>
-          </a:solidFill>
-          <a:prstDash val="solid"/>
-        </a:ln>
-        <a:effectLst/>
-      </dsp:spPr>
-      <dsp:style>
-        <a:lnRef idx="2">
-          <a:scrgbClr r="0" g="0" b="0"/>
-        </a:lnRef>
-        <a:fillRef idx="1">
-          <a:scrgbClr r="0" g="0" b="0"/>
-        </a:fillRef>
-        <a:effectRef idx="0">
-          <a:scrgbClr r="0" g="0" b="0"/>
-        </a:effectRef>
-        <a:fontRef idx="minor">
-          <a:schemeClr val="lt1"/>
-        </a:fontRef>
-      </dsp:style>
-      <dsp:txBody>
-        <a:bodyPr spcFirstLastPara="0" vert="horz" wrap="square" lIns="102870" tIns="102870" rIns="102870" bIns="102870" numCol="1" spcCol="1270" anchor="ctr" anchorCtr="0">
-          <a:noAutofit/>
-        </a:bodyPr>
-        <a:lstStyle/>
-        <a:p>
-          <a:pPr lvl="0" algn="ctr" defTabSz="1200150">
-            <a:lnSpc>
-              <a:spcPct val="90000"/>
-            </a:lnSpc>
-            <a:spcBef>
-              <a:spcPct val="0"/>
-            </a:spcBef>
-            <a:spcAft>
-              <a:spcPct val="35000"/>
-            </a:spcAft>
-          </a:pPr>
-          <a:r>
-            <a:rPr lang="en-GB" sz="2700" kern="1200" dirty="0" err="1" smtClean="0"/>
-            <a:t>RequireJS</a:t>
-          </a:r>
-          <a:r>
-            <a:rPr lang="en-GB" sz="2700" kern="1200" dirty="0" smtClean="0"/>
-            <a:t/>
-          </a:r>
-          <a:br>
-            <a:rPr lang="en-GB" sz="2700" kern="1200" dirty="0" smtClean="0"/>
-          </a:br>
-          <a:r>
-            <a:rPr lang="en-GB" sz="1400" kern="1200" dirty="0" smtClean="0"/>
-            <a:t>(makes it modular, gives you dependency injection)</a:t>
-          </a:r>
-          <a:endParaRPr lang="en-GB" sz="1400" kern="1200" dirty="0"/>
-        </a:p>
-      </dsp:txBody>
-      <dsp:txXfrm>
-        <a:off x="2671" y="1467802"/>
-        <a:ext cx="1821727" cy="3082385"/>
-      </dsp:txXfrm>
-    </dsp:sp>
-    <dsp:sp modelId="{72C2FE39-7E00-4087-9684-BAB3E0EAB31C}">
-      <dsp:nvSpPr>
-        <dsp:cNvPr id="0" name=""/>
-        <dsp:cNvSpPr/>
-      </dsp:nvSpPr>
-      <dsp:spPr>
-        <a:xfrm>
-          <a:off x="1824398" y="1467802"/>
-          <a:ext cx="1821727" cy="3082385"/>
-        </a:xfrm>
-        <a:prstGeom prst="rect">
-          <a:avLst/>
-        </a:prstGeom>
-        <a:solidFill>
-          <a:schemeClr val="accent1">
-            <a:hueOff val="0"/>
-            <a:satOff val="0"/>
-            <a:lumOff val="0"/>
-            <a:alphaOff val="0"/>
-          </a:schemeClr>
-        </a:solidFill>
-        <a:ln w="15875" cap="flat" cmpd="sng" algn="ctr">
-          <a:solidFill>
-            <a:schemeClr val="lt1">
-              <a:hueOff val="0"/>
-              <a:satOff val="0"/>
-              <a:lumOff val="0"/>
-              <a:alphaOff val="0"/>
-            </a:schemeClr>
-          </a:solidFill>
-          <a:prstDash val="solid"/>
-        </a:ln>
-        <a:effectLst/>
-      </dsp:spPr>
-      <dsp:style>
-        <a:lnRef idx="2">
-          <a:scrgbClr r="0" g="0" b="0"/>
-        </a:lnRef>
-        <a:fillRef idx="1">
-          <a:scrgbClr r="0" g="0" b="0"/>
-        </a:fillRef>
-        <a:effectRef idx="0">
-          <a:scrgbClr r="0" g="0" b="0"/>
-        </a:effectRef>
-        <a:fontRef idx="minor">
-          <a:schemeClr val="lt1"/>
-        </a:fontRef>
-      </dsp:style>
-      <dsp:txBody>
-        <a:bodyPr spcFirstLastPara="0" vert="horz" wrap="square" lIns="99060" tIns="99060" rIns="99060" bIns="99060" numCol="1" spcCol="1270" anchor="ctr" anchorCtr="0">
-          <a:noAutofit/>
-        </a:bodyPr>
-        <a:lstStyle/>
-        <a:p>
-          <a:pPr lvl="0" algn="ctr" defTabSz="1155700">
-            <a:lnSpc>
-              <a:spcPct val="90000"/>
-            </a:lnSpc>
-            <a:spcBef>
-              <a:spcPct val="0"/>
-            </a:spcBef>
-            <a:spcAft>
-              <a:spcPct val="35000"/>
-            </a:spcAft>
-          </a:pPr>
-          <a:r>
-            <a:rPr lang="en-GB" sz="2600" kern="1200" dirty="0" err="1" smtClean="0"/>
-            <a:t>KnockoutJS</a:t>
-          </a:r>
-          <a:r>
-            <a:rPr lang="en-GB" sz="2600" kern="1200" dirty="0" smtClean="0"/>
-            <a:t/>
-          </a:r>
-          <a:br>
-            <a:rPr lang="en-GB" sz="2600" kern="1200" dirty="0" smtClean="0"/>
-          </a:br>
-          <a:r>
-            <a:rPr lang="en-GB" sz="1400" kern="1200" dirty="0" smtClean="0"/>
-            <a:t>(gives you a “strongly-typed” event-driven JS </a:t>
-          </a:r>
-          <a:r>
-            <a:rPr lang="en-GB" sz="1400" kern="1200" dirty="0" err="1" smtClean="0"/>
-            <a:t>viewmodel</a:t>
-          </a:r>
-          <a:r>
-            <a:rPr lang="en-GB" sz="1400" kern="1200" dirty="0" smtClean="0"/>
-            <a:t>)</a:t>
-          </a:r>
-          <a:endParaRPr lang="en-GB" sz="1400" kern="1200" dirty="0"/>
-        </a:p>
-      </dsp:txBody>
-      <dsp:txXfrm>
-        <a:off x="1824398" y="1467802"/>
-        <a:ext cx="1821727" cy="3082385"/>
-      </dsp:txXfrm>
-    </dsp:sp>
-    <dsp:sp modelId="{9DB913F8-C38E-458C-A268-D277B6F21C86}">
-      <dsp:nvSpPr>
-        <dsp:cNvPr id="0" name=""/>
-        <dsp:cNvSpPr/>
-      </dsp:nvSpPr>
-      <dsp:spPr>
-        <a:xfrm>
-          <a:off x="3646126" y="1467802"/>
-          <a:ext cx="1821727" cy="3082385"/>
-        </a:xfrm>
-        <a:prstGeom prst="rect">
-          <a:avLst/>
-        </a:prstGeom>
-        <a:solidFill>
-          <a:schemeClr val="accent1">
-            <a:hueOff val="0"/>
-            <a:satOff val="0"/>
-            <a:lumOff val="0"/>
-            <a:alphaOff val="0"/>
-          </a:schemeClr>
-        </a:solidFill>
-        <a:ln w="15875" cap="flat" cmpd="sng" algn="ctr">
-          <a:solidFill>
-            <a:schemeClr val="lt1">
-              <a:hueOff val="0"/>
-              <a:satOff val="0"/>
-              <a:lumOff val="0"/>
-              <a:alphaOff val="0"/>
-            </a:schemeClr>
-          </a:solidFill>
-          <a:prstDash val="solid"/>
-        </a:ln>
-        <a:effectLst/>
-      </dsp:spPr>
-      <dsp:style>
-        <a:lnRef idx="2">
-          <a:scrgbClr r="0" g="0" b="0"/>
-        </a:lnRef>
-        <a:fillRef idx="1">
-          <a:scrgbClr r="0" g="0" b="0"/>
-        </a:fillRef>
-        <a:effectRef idx="0">
-          <a:scrgbClr r="0" g="0" b="0"/>
-        </a:effectRef>
-        <a:fontRef idx="minor">
-          <a:schemeClr val="lt1"/>
-        </a:fontRef>
-      </dsp:style>
-      <dsp:txBody>
-        <a:bodyPr spcFirstLastPara="0" vert="horz" wrap="square" lIns="110490" tIns="110490" rIns="110490" bIns="110490" numCol="1" spcCol="1270" anchor="ctr" anchorCtr="0">
-          <a:noAutofit/>
-        </a:bodyPr>
-        <a:lstStyle/>
-        <a:p>
-          <a:pPr lvl="0" algn="ctr" defTabSz="1289050">
-            <a:lnSpc>
-              <a:spcPct val="90000"/>
-            </a:lnSpc>
-            <a:spcBef>
-              <a:spcPct val="0"/>
-            </a:spcBef>
-            <a:spcAft>
-              <a:spcPct val="35000"/>
-            </a:spcAft>
-          </a:pPr>
-          <a:r>
-            <a:rPr lang="en-GB" sz="2900" kern="1200" dirty="0" err="1" smtClean="0"/>
-            <a:t>BreezeJS</a:t>
-          </a:r>
-          <a:r>
-            <a:rPr lang="en-GB" sz="2900" kern="1200" dirty="0" smtClean="0"/>
-            <a:t/>
-          </a:r>
-          <a:br>
-            <a:rPr lang="en-GB" sz="2900" kern="1200" dirty="0" smtClean="0"/>
-          </a:br>
-          <a:r>
-            <a:rPr lang="en-GB" sz="1400" kern="1200" dirty="0" smtClean="0"/>
-            <a:t>(used by your KO </a:t>
-          </a:r>
-          <a:r>
-            <a:rPr lang="en-GB" sz="1400" kern="1200" dirty="0" err="1" smtClean="0"/>
-            <a:t>viewmodel</a:t>
-          </a:r>
-          <a:r>
-            <a:rPr lang="en-GB" sz="1400" kern="1200" dirty="0" smtClean="0"/>
-            <a:t> to get data from the server)</a:t>
-          </a:r>
-          <a:endParaRPr lang="en-GB" sz="1400" kern="1200" dirty="0"/>
-        </a:p>
-      </dsp:txBody>
-      <dsp:txXfrm>
-        <a:off x="3646126" y="1467802"/>
-        <a:ext cx="1821727" cy="3082385"/>
-      </dsp:txXfrm>
-    </dsp:sp>
-    <dsp:sp modelId="{FC7B5C2B-571A-4289-B47A-5603521EB002}">
-      <dsp:nvSpPr>
-        <dsp:cNvPr id="0" name=""/>
-        <dsp:cNvSpPr/>
-      </dsp:nvSpPr>
-      <dsp:spPr>
-        <a:xfrm>
-          <a:off x="0" y="4550187"/>
-          <a:ext cx="5470525" cy="342487"/>
-        </a:xfrm>
-        <a:prstGeom prst="rect">
-          <a:avLst/>
-        </a:prstGeom>
-        <a:solidFill>
-          <a:schemeClr val="accent1">
-            <a:shade val="80000"/>
-            <a:hueOff val="0"/>
-            <a:satOff val="0"/>
-            <a:lumOff val="0"/>
-            <a:alphaOff val="0"/>
-          </a:schemeClr>
-        </a:solidFill>
-        <a:ln>
-          <a:noFill/>
-        </a:ln>
-        <a:effectLst/>
-      </dsp:spPr>
-      <dsp:style>
-        <a:lnRef idx="0">
-          <a:scrgbClr r="0" g="0" b="0"/>
-        </a:lnRef>
-        <a:fillRef idx="1">
-          <a:scrgbClr r="0" g="0" b="0"/>
-        </a:fillRef>
-        <a:effectRef idx="0">
-          <a:scrgbClr r="0" g="0" b="0"/>
-        </a:effectRef>
-        <a:fontRef idx="minor"/>
-      </dsp:style>
-    </dsp:sp>
   </dsp:spTree>
 </dsp:drawing>
 </file>
@@ -5534,399 +5146,6 @@
       <dsp:cNvGrpSpPr/>
     </dsp:nvGrpSpPr>
     <dsp:grpSpPr/>
-    <dsp:sp modelId="{53913FA0-0201-467F-A8B1-E435F74F870C}">
-      <dsp:nvSpPr>
-        <dsp:cNvPr id="0" name=""/>
-        <dsp:cNvSpPr/>
-      </dsp:nvSpPr>
-      <dsp:spPr>
-        <a:xfrm>
-          <a:off x="0" y="0"/>
-          <a:ext cx="5470525" cy="1467802"/>
-        </a:xfrm>
-        <a:prstGeom prst="rect">
-          <a:avLst/>
-        </a:prstGeom>
-        <a:solidFill>
-          <a:schemeClr val="accent1">
-            <a:shade val="80000"/>
-            <a:hueOff val="0"/>
-            <a:satOff val="0"/>
-            <a:lumOff val="0"/>
-            <a:alphaOff val="0"/>
-          </a:schemeClr>
-        </a:solidFill>
-        <a:ln>
-          <a:noFill/>
-        </a:ln>
-        <a:effectLst/>
-      </dsp:spPr>
-      <dsp:style>
-        <a:lnRef idx="0">
-          <a:scrgbClr r="0" g="0" b="0"/>
-        </a:lnRef>
-        <a:fillRef idx="1">
-          <a:scrgbClr r="0" g="0" b="0"/>
-        </a:fillRef>
-        <a:effectRef idx="0">
-          <a:scrgbClr r="0" g="0" b="0"/>
-        </a:effectRef>
-        <a:fontRef idx="minor"/>
-      </dsp:style>
-      <dsp:txBody>
-        <a:bodyPr spcFirstLastPara="0" vert="horz" wrap="square" lIns="247650" tIns="247650" rIns="247650" bIns="247650" numCol="1" spcCol="1270" anchor="ctr" anchorCtr="0">
-          <a:noAutofit/>
-        </a:bodyPr>
-        <a:lstStyle/>
-        <a:p>
-          <a:pPr lvl="0" algn="ctr" defTabSz="2889250">
-            <a:lnSpc>
-              <a:spcPct val="90000"/>
-            </a:lnSpc>
-            <a:spcBef>
-              <a:spcPct val="0"/>
-            </a:spcBef>
-            <a:spcAft>
-              <a:spcPct val="35000"/>
-            </a:spcAft>
-          </a:pPr>
-          <a:r>
-            <a:rPr lang="en-GB" sz="6500" kern="1200" dirty="0" smtClean="0"/>
-            <a:t>Model</a:t>
-          </a:r>
-          <a:endParaRPr lang="en-GB" sz="6500" kern="1200" dirty="0"/>
-        </a:p>
-      </dsp:txBody>
-      <dsp:txXfrm>
-        <a:off x="0" y="0"/>
-        <a:ext cx="5470525" cy="1467802"/>
-      </dsp:txXfrm>
-    </dsp:sp>
-    <dsp:sp modelId="{7F600215-281D-4E32-B411-0401B722F918}">
-      <dsp:nvSpPr>
-        <dsp:cNvPr id="0" name=""/>
-        <dsp:cNvSpPr/>
-      </dsp:nvSpPr>
-      <dsp:spPr>
-        <a:xfrm>
-          <a:off x="2671" y="1467802"/>
-          <a:ext cx="1821727" cy="3082385"/>
-        </a:xfrm>
-        <a:prstGeom prst="rect">
-          <a:avLst/>
-        </a:prstGeom>
-        <a:solidFill>
-          <a:schemeClr val="accent1">
-            <a:hueOff val="0"/>
-            <a:satOff val="0"/>
-            <a:lumOff val="0"/>
-            <a:alphaOff val="0"/>
-          </a:schemeClr>
-        </a:solidFill>
-        <a:ln w="15875" cap="flat" cmpd="sng" algn="ctr">
-          <a:solidFill>
-            <a:schemeClr val="lt1">
-              <a:hueOff val="0"/>
-              <a:satOff val="0"/>
-              <a:lumOff val="0"/>
-              <a:alphaOff val="0"/>
-            </a:schemeClr>
-          </a:solidFill>
-          <a:prstDash val="solid"/>
-        </a:ln>
-        <a:effectLst/>
-      </dsp:spPr>
-      <dsp:style>
-        <a:lnRef idx="2">
-          <a:scrgbClr r="0" g="0" b="0"/>
-        </a:lnRef>
-        <a:fillRef idx="1">
-          <a:scrgbClr r="0" g="0" b="0"/>
-        </a:fillRef>
-        <a:effectRef idx="0">
-          <a:scrgbClr r="0" g="0" b="0"/>
-        </a:effectRef>
-        <a:fontRef idx="minor">
-          <a:schemeClr val="lt1"/>
-        </a:fontRef>
-      </dsp:style>
-      <dsp:txBody>
-        <a:bodyPr spcFirstLastPara="0" vert="horz" wrap="square" lIns="106680" tIns="106680" rIns="106680" bIns="106680" numCol="1" spcCol="1270" anchor="ctr" anchorCtr="0">
-          <a:noAutofit/>
-        </a:bodyPr>
-        <a:lstStyle/>
-        <a:p>
-          <a:pPr lvl="0" algn="ctr" defTabSz="1244600">
-            <a:lnSpc>
-              <a:spcPct val="90000"/>
-            </a:lnSpc>
-            <a:spcBef>
-              <a:spcPct val="0"/>
-            </a:spcBef>
-            <a:spcAft>
-              <a:spcPct val="35000"/>
-            </a:spcAft>
-          </a:pPr>
-          <a:r>
-            <a:rPr lang="en-GB" sz="2800" kern="1200" dirty="0" smtClean="0"/>
-            <a:t>MVC controller</a:t>
-          </a:r>
-          <a:br>
-            <a:rPr lang="en-GB" sz="2800" kern="1200" dirty="0" smtClean="0"/>
-          </a:br>
-          <a:r>
-            <a:rPr lang="en-GB" sz="2800" kern="1200" dirty="0" smtClean="0"/>
-            <a:t/>
-          </a:r>
-          <a:br>
-            <a:rPr lang="en-GB" sz="2800" kern="1200" dirty="0" smtClean="0"/>
-          </a:br>
-          <a:r>
-            <a:rPr lang="en-GB" sz="2800" kern="1200" dirty="0" smtClean="0"/>
-            <a:t>View (HTML)</a:t>
-          </a:r>
-          <a:endParaRPr lang="en-GB" sz="2800" kern="1200" dirty="0"/>
-        </a:p>
-      </dsp:txBody>
-      <dsp:txXfrm>
-        <a:off x="2671" y="1467802"/>
-        <a:ext cx="1821727" cy="3082385"/>
-      </dsp:txXfrm>
-    </dsp:sp>
-    <dsp:sp modelId="{72C2FE39-7E00-4087-9684-BAB3E0EAB31C}">
-      <dsp:nvSpPr>
-        <dsp:cNvPr id="0" name=""/>
-        <dsp:cNvSpPr/>
-      </dsp:nvSpPr>
-      <dsp:spPr>
-        <a:xfrm>
-          <a:off x="1824398" y="1467802"/>
-          <a:ext cx="1821727" cy="3082385"/>
-        </a:xfrm>
-        <a:prstGeom prst="rect">
-          <a:avLst/>
-        </a:prstGeom>
-        <a:solidFill>
-          <a:schemeClr val="accent1">
-            <a:hueOff val="0"/>
-            <a:satOff val="0"/>
-            <a:lumOff val="0"/>
-            <a:alphaOff val="0"/>
-          </a:schemeClr>
-        </a:solidFill>
-        <a:ln w="15875" cap="flat" cmpd="sng" algn="ctr">
-          <a:solidFill>
-            <a:schemeClr val="lt1">
-              <a:hueOff val="0"/>
-              <a:satOff val="0"/>
-              <a:lumOff val="0"/>
-              <a:alphaOff val="0"/>
-            </a:schemeClr>
-          </a:solidFill>
-          <a:prstDash val="solid"/>
-        </a:ln>
-        <a:effectLst/>
-      </dsp:spPr>
-      <dsp:style>
-        <a:lnRef idx="2">
-          <a:scrgbClr r="0" g="0" b="0"/>
-        </a:lnRef>
-        <a:fillRef idx="1">
-          <a:scrgbClr r="0" g="0" b="0"/>
-        </a:fillRef>
-        <a:effectRef idx="0">
-          <a:scrgbClr r="0" g="0" b="0"/>
-        </a:effectRef>
-        <a:fontRef idx="minor">
-          <a:schemeClr val="lt1"/>
-        </a:fontRef>
-      </dsp:style>
-      <dsp:txBody>
-        <a:bodyPr spcFirstLastPara="0" vert="horz" wrap="square" lIns="106680" tIns="106680" rIns="106680" bIns="106680" numCol="1" spcCol="1270" anchor="ctr" anchorCtr="0">
-          <a:noAutofit/>
-        </a:bodyPr>
-        <a:lstStyle/>
-        <a:p>
-          <a:pPr lvl="0" algn="ctr" defTabSz="1244600">
-            <a:lnSpc>
-              <a:spcPct val="90000"/>
-            </a:lnSpc>
-            <a:spcBef>
-              <a:spcPct val="0"/>
-            </a:spcBef>
-            <a:spcAft>
-              <a:spcPct val="35000"/>
-            </a:spcAft>
-          </a:pPr>
-          <a:r>
-            <a:rPr lang="en-GB" sz="2800" kern="1200" dirty="0" smtClean="0"/>
-            <a:t>Web API controller</a:t>
-          </a:r>
-          <a:br>
-            <a:rPr lang="en-GB" sz="2800" kern="1200" dirty="0" smtClean="0"/>
-          </a:br>
-          <a:r>
-            <a:rPr lang="en-GB" sz="2800" kern="1200" dirty="0" smtClean="0"/>
-            <a:t/>
-          </a:r>
-          <a:br>
-            <a:rPr lang="en-GB" sz="2800" kern="1200" dirty="0" smtClean="0"/>
-          </a:br>
-          <a:r>
-            <a:rPr lang="en-GB" sz="2800" kern="1200" dirty="0" smtClean="0"/>
-            <a:t>View (OData)</a:t>
-          </a:r>
-          <a:endParaRPr lang="en-GB" sz="2800" kern="1200" dirty="0"/>
-        </a:p>
-      </dsp:txBody>
-      <dsp:txXfrm>
-        <a:off x="1824398" y="1467802"/>
-        <a:ext cx="1821727" cy="3082385"/>
-      </dsp:txXfrm>
-    </dsp:sp>
-    <dsp:sp modelId="{9DB913F8-C38E-458C-A268-D277B6F21C86}">
-      <dsp:nvSpPr>
-        <dsp:cNvPr id="0" name=""/>
-        <dsp:cNvSpPr/>
-      </dsp:nvSpPr>
-      <dsp:spPr>
-        <a:xfrm>
-          <a:off x="3646126" y="1467802"/>
-          <a:ext cx="1821727" cy="3082385"/>
-        </a:xfrm>
-        <a:prstGeom prst="rect">
-          <a:avLst/>
-        </a:prstGeom>
-        <a:solidFill>
-          <a:schemeClr val="accent1">
-            <a:hueOff val="0"/>
-            <a:satOff val="0"/>
-            <a:lumOff val="0"/>
-            <a:alphaOff val="0"/>
-          </a:schemeClr>
-        </a:solidFill>
-        <a:ln w="15875" cap="flat" cmpd="sng" algn="ctr">
-          <a:solidFill>
-            <a:schemeClr val="lt1">
-              <a:hueOff val="0"/>
-              <a:satOff val="0"/>
-              <a:lumOff val="0"/>
-              <a:alphaOff val="0"/>
-            </a:schemeClr>
-          </a:solidFill>
-          <a:prstDash val="solid"/>
-        </a:ln>
-        <a:effectLst/>
-      </dsp:spPr>
-      <dsp:style>
-        <a:lnRef idx="2">
-          <a:scrgbClr r="0" g="0" b="0"/>
-        </a:lnRef>
-        <a:fillRef idx="1">
-          <a:scrgbClr r="0" g="0" b="0"/>
-        </a:fillRef>
-        <a:effectRef idx="0">
-          <a:scrgbClr r="0" g="0" b="0"/>
-        </a:effectRef>
-        <a:fontRef idx="minor">
-          <a:schemeClr val="lt1"/>
-        </a:fontRef>
-      </dsp:style>
-      <dsp:txBody>
-        <a:bodyPr spcFirstLastPara="0" vert="horz" wrap="square" lIns="106680" tIns="106680" rIns="106680" bIns="106680" numCol="1" spcCol="1270" anchor="ctr" anchorCtr="0">
-          <a:noAutofit/>
-        </a:bodyPr>
-        <a:lstStyle/>
-        <a:p>
-          <a:pPr lvl="0" algn="ctr" defTabSz="1244600">
-            <a:lnSpc>
-              <a:spcPct val="90000"/>
-            </a:lnSpc>
-            <a:spcBef>
-              <a:spcPct val="0"/>
-            </a:spcBef>
-            <a:spcAft>
-              <a:spcPct val="35000"/>
-            </a:spcAft>
-          </a:pPr>
-          <a:r>
-            <a:rPr lang="en-GB" sz="2800" kern="1200" dirty="0" err="1" smtClean="0"/>
-            <a:t>Viewmodel</a:t>
-          </a:r>
-          <a:r>
-            <a:rPr lang="en-GB" sz="2800" kern="1200" dirty="0" smtClean="0"/>
-            <a:t> (</a:t>
-          </a:r>
-          <a:r>
-            <a:rPr lang="en-GB" sz="2800" kern="1200" dirty="0" err="1" smtClean="0"/>
-            <a:t>Javascript</a:t>
-          </a:r>
-          <a:r>
-            <a:rPr lang="en-GB" sz="2800" kern="1200" dirty="0" smtClean="0"/>
-            <a:t>)</a:t>
-          </a:r>
-          <a:br>
-            <a:rPr lang="en-GB" sz="2800" kern="1200" dirty="0" smtClean="0"/>
-          </a:br>
-          <a:r>
-            <a:rPr lang="en-GB" sz="2800" kern="1200" dirty="0" smtClean="0"/>
-            <a:t/>
-          </a:r>
-          <a:br>
-            <a:rPr lang="en-GB" sz="2800" kern="1200" dirty="0" smtClean="0"/>
-          </a:br>
-          <a:r>
-            <a:rPr lang="en-GB" sz="2800" kern="1200" dirty="0" smtClean="0"/>
-            <a:t>View (HTML)</a:t>
-          </a:r>
-          <a:endParaRPr lang="en-GB" sz="2800" kern="1200" dirty="0"/>
-        </a:p>
-      </dsp:txBody>
-      <dsp:txXfrm>
-        <a:off x="3646126" y="1467802"/>
-        <a:ext cx="1821727" cy="3082385"/>
-      </dsp:txXfrm>
-    </dsp:sp>
-    <dsp:sp modelId="{FC7B5C2B-571A-4289-B47A-5603521EB002}">
-      <dsp:nvSpPr>
-        <dsp:cNvPr id="0" name=""/>
-        <dsp:cNvSpPr/>
-      </dsp:nvSpPr>
-      <dsp:spPr>
-        <a:xfrm>
-          <a:off x="0" y="4550187"/>
-          <a:ext cx="5470525" cy="342487"/>
-        </a:xfrm>
-        <a:prstGeom prst="rect">
-          <a:avLst/>
-        </a:prstGeom>
-        <a:solidFill>
-          <a:schemeClr val="accent1">
-            <a:shade val="80000"/>
-            <a:hueOff val="0"/>
-            <a:satOff val="0"/>
-            <a:lumOff val="0"/>
-            <a:alphaOff val="0"/>
-          </a:schemeClr>
-        </a:solidFill>
-        <a:ln>
-          <a:noFill/>
-        </a:ln>
-        <a:effectLst/>
-      </dsp:spPr>
-      <dsp:style>
-        <a:lnRef idx="0">
-          <a:scrgbClr r="0" g="0" b="0"/>
-        </a:lnRef>
-        <a:fillRef idx="1">
-          <a:scrgbClr r="0" g="0" b="0"/>
-        </a:fillRef>
-        <a:effectRef idx="0">
-          <a:scrgbClr r="0" g="0" b="0"/>
-        </a:effectRef>
-        <a:fontRef idx="minor"/>
-      </dsp:style>
-    </dsp:sp>
   </dsp:spTree>
 </dsp:drawing>
 </file>
@@ -9763,7 +8982,7 @@
           <a:p>
             <a:fld id="{762B48F5-BACC-47D6-A0F7-82FBF9C6BC85}" type="datetimeFigureOut">
               <a:rPr lang="en-US"/>
-              <a:t>12/3/2013</a:t>
+              <a:t>1/15/2014</a:t>
             </a:fld>
             <a:endParaRPr/>
           </a:p>
@@ -9928,7 +9147,7 @@
           <a:p>
             <a:fld id="{0CB1CD00-5424-4675-AB18-2C419B060449}" type="datetimeFigureOut">
               <a:rPr lang="en-US"/>
-              <a:t>12/3/2013</a:t>
+              <a:t>1/15/2014</a:t>
             </a:fld>
             <a:endParaRPr/>
           </a:p>
@@ -10619,7 +9838,7 @@
             <a:fld id="{B61BEF0D-F0BB-DE4B-95CE-6DB70DBA9567}" type="datetimeFigureOut">
               <a:rPr lang="en-US" smtClean="0"/>
               <a:pPr/>
-              <a:t>12/3/2013</a:t>
+              <a:t>1/15/2014</a:t>
             </a:fld>
             <a:endParaRPr lang="en-US" dirty="0"/>
           </a:p>
@@ -11041,7 +10260,7 @@
             <a:fld id="{37CC0096-1860-4642-9CD2-0079EA5E7CD1}" type="datetimeFigureOut">
               <a:rPr lang="en-US" smtClean="0"/>
               <a:pPr/>
-              <a:t>12/3/2013</a:t>
+              <a:t>1/15/2014</a:t>
             </a:fld>
             <a:endParaRPr lang="en-US"/>
           </a:p>
@@ -11291,7 +10510,7 @@
             <a:fld id="{37CC0096-1860-4642-9CD2-0079EA5E7CD1}" type="datetimeFigureOut">
               <a:rPr lang="en-US" smtClean="0"/>
               <a:pPr/>
-              <a:t>12/3/2013</a:t>
+              <a:t>1/15/2014</a:t>
             </a:fld>
             <a:endParaRPr lang="en-US"/>
           </a:p>
@@ -11632,7 +10851,7 @@
             <a:fld id="{37CC0096-1860-4642-9CD2-0079EA5E7CD1}" type="datetimeFigureOut">
               <a:rPr lang="en-US" smtClean="0"/>
               <a:pPr/>
-              <a:t>12/3/2013</a:t>
+              <a:t>1/15/2014</a:t>
             </a:fld>
             <a:endParaRPr lang="en-US"/>
           </a:p>
@@ -11981,7 +11200,7 @@
             <a:fld id="{37CC0096-1860-4642-9CD2-0079EA5E7CD1}" type="datetimeFigureOut">
               <a:rPr lang="en-US" smtClean="0"/>
               <a:pPr/>
-              <a:t>12/3/2013</a:t>
+              <a:t>1/15/2014</a:t>
             </a:fld>
             <a:endParaRPr lang="en-US"/>
           </a:p>
@@ -12357,7 +11576,7 @@
             <a:fld id="{37CC0096-1860-4642-9CD2-0079EA5E7CD1}" type="datetimeFigureOut">
               <a:rPr lang="en-US" smtClean="0"/>
               <a:pPr/>
-              <a:t>12/3/2013</a:t>
+              <a:t>1/15/2014</a:t>
             </a:fld>
             <a:endParaRPr lang="en-US"/>
           </a:p>
@@ -12829,7 +12048,7 @@
             <a:fld id="{37CC0096-1860-4642-9CD2-0079EA5E7CD1}" type="datetimeFigureOut">
               <a:rPr lang="en-US" smtClean="0"/>
               <a:pPr/>
-              <a:t>12/3/2013</a:t>
+              <a:t>1/15/2014</a:t>
             </a:fld>
             <a:endParaRPr lang="en-US"/>
           </a:p>
@@ -13035,7 +12254,7 @@
           <a:p>
             <a:fld id="{37CC0096-1860-4642-9CD2-0079EA5E7CD1}" type="datetimeFigureOut">
               <a:rPr lang="en-US" smtClean="0"/>
-              <a:t>12/3/2013</a:t>
+              <a:t>1/15/2014</a:t>
             </a:fld>
             <a:endParaRPr lang="en-US"/>
           </a:p>
@@ -13246,7 +12465,7 @@
           <a:p>
             <a:fld id="{37CC0096-1860-4642-9CD2-0079EA5E7CD1}" type="datetimeFigureOut">
               <a:rPr lang="en-US" smtClean="0"/>
-              <a:t>12/3/2013</a:t>
+              <a:t>1/15/2014</a:t>
             </a:fld>
             <a:endParaRPr lang="en-US"/>
           </a:p>
@@ -13561,7 +12780,7 @@
           <a:p>
             <a:fld id="{37CC0096-1860-4642-9CD2-0079EA5E7CD1}" type="datetimeFigureOut">
               <a:rPr lang="en-US" smtClean="0"/>
-              <a:t>12/3/2013</a:t>
+              <a:t>1/15/2014</a:t>
             </a:fld>
             <a:endParaRPr lang="en-US"/>
           </a:p>
@@ -13777,7 +12996,7 @@
           <a:p>
             <a:fld id="{37CC0096-1860-4642-9CD2-0079EA5E7CD1}" type="datetimeFigureOut">
               <a:rPr lang="en-US" smtClean="0"/>
-              <a:t>12/3/2013</a:t>
+              <a:t>1/15/2014</a:t>
             </a:fld>
             <a:endParaRPr lang="en-US"/>
           </a:p>
@@ -14026,7 +13245,7 @@
             <a:fld id="{B61BEF0D-F0BB-DE4B-95CE-6DB70DBA9567}" type="datetimeFigureOut">
               <a:rPr lang="en-US" smtClean="0"/>
               <a:pPr/>
-              <a:t>12/3/2013</a:t>
+              <a:t>1/15/2014</a:t>
             </a:fld>
             <a:endParaRPr lang="en-US" dirty="0"/>
           </a:p>
@@ -14294,7 +13513,7 @@
           <a:p>
             <a:fld id="{37CC0096-1860-4642-9CD2-0079EA5E7CD1}" type="datetimeFigureOut">
               <a:rPr lang="en-US" smtClean="0"/>
-              <a:t>12/3/2013</a:t>
+              <a:t>1/15/2014</a:t>
             </a:fld>
             <a:endParaRPr lang="en-US"/>
           </a:p>
@@ -14707,7 +13926,7 @@
           <a:p>
             <a:fld id="{37CC0096-1860-4642-9CD2-0079EA5E7CD1}" type="datetimeFigureOut">
               <a:rPr lang="en-US" smtClean="0"/>
-              <a:t>12/3/2013</a:t>
+              <a:t>1/15/2014</a:t>
             </a:fld>
             <a:endParaRPr lang="en-US"/>
           </a:p>
@@ -14856,7 +14075,7 @@
           <a:p>
             <a:fld id="{37CC0096-1860-4642-9CD2-0079EA5E7CD1}" type="datetimeFigureOut">
               <a:rPr lang="en-US" smtClean="0"/>
-              <a:t>12/3/2013</a:t>
+              <a:t>1/15/2014</a:t>
             </a:fld>
             <a:endParaRPr lang="en-US"/>
           </a:p>
@@ -14982,7 +14201,7 @@
           <a:p>
             <a:fld id="{37CC0096-1860-4642-9CD2-0079EA5E7CD1}" type="datetimeFigureOut">
               <a:rPr lang="en-US" smtClean="0"/>
-              <a:t>12/3/2013</a:t>
+              <a:t>1/15/2014</a:t>
             </a:fld>
             <a:endParaRPr lang="en-US"/>
           </a:p>
@@ -15237,7 +14456,7 @@
           <a:p>
             <a:fld id="{37CC0096-1860-4642-9CD2-0079EA5E7CD1}" type="datetimeFigureOut">
               <a:rPr lang="en-US" smtClean="0"/>
-              <a:t>12/3/2013</a:t>
+              <a:t>1/15/2014</a:t>
             </a:fld>
             <a:endParaRPr lang="en-US"/>
           </a:p>
@@ -15552,7 +14771,7 @@
           <a:p>
             <a:fld id="{37CC0096-1860-4642-9CD2-0079EA5E7CD1}" type="datetimeFigureOut">
               <a:rPr lang="en-US" smtClean="0"/>
-              <a:t>12/3/2013</a:t>
+              <a:t>1/15/2014</a:t>
             </a:fld>
             <a:endParaRPr lang="en-US"/>
           </a:p>
@@ -15953,7 +15172,7 @@
             <a:fld id="{37CC0096-1860-4642-9CD2-0079EA5E7CD1}" type="datetimeFigureOut">
               <a:rPr lang="en-US" smtClean="0"/>
               <a:pPr/>
-              <a:t>12/3/2013</a:t>
+              <a:t>1/15/2014</a:t>
             </a:fld>
             <a:endParaRPr lang="en-US"/>
           </a:p>
@@ -16554,13 +15773,8 @@
           <a:p>
             <a:r>
               <a:rPr lang="en-GB" dirty="0" smtClean="0"/>
-              <a:t>Benjamin </a:t>
-            </a:r>
-            <a:r>
-              <a:rPr lang="en-GB" dirty="0" smtClean="0"/>
-              <a:t>Howarth</a:t>
-            </a:r>
-            <a:endParaRPr lang="en-GB" dirty="0" smtClean="0"/>
+              <a:t>Benjamin Howarth</a:t>
+            </a:r>
           </a:p>
         </p:txBody>
       </p:sp>
@@ -17222,6 +16436,15 @@
             <a:r>
               <a:rPr lang="en-GB" dirty="0" smtClean="0">
                 <a:hlinkClick r:id="rId3"/>
+              </a:rPr>
+              <a:t>http://www.codegecko.com</a:t>
+            </a:r>
+            <a:endParaRPr lang="en-GB" dirty="0" smtClean="0"/>
+          </a:p>
+          <a:p>
+            <a:r>
+              <a:rPr lang="en-GB" dirty="0" smtClean="0">
+                <a:hlinkClick r:id="rId4"/>
               </a:rPr>
               <a:t>http://github.com/codegecko</a:t>
             </a:r>
@@ -19149,8 +18372,9 @@
             </a:r>
           </a:p>
           <a:p>
-            <a:r>
-              <a:rPr lang="en-GB" sz="2000" dirty="0" smtClean="0"/>
+            <a:pPr lvl="1"/>
+            <a:r>
+              <a:rPr lang="en-GB" sz="1600" dirty="0" smtClean="0"/>
               <a:t>N.B. Every time you do this, a kitten dies.</a:t>
             </a:r>
           </a:p>
@@ -19428,33 +18652,15 @@
                                   </p:childTnLst>
                                 </p:cTn>
                               </p:par>
-                            </p:childTnLst>
-                          </p:cTn>
-                        </p:par>
-                      </p:childTnLst>
-                    </p:cTn>
-                  </p:par>
-                  <p:par>
-                    <p:cTn id="19" fill="hold">
-                      <p:stCondLst>
-                        <p:cond delay="indefinite"/>
-                      </p:stCondLst>
-                      <p:childTnLst>
-                        <p:par>
-                          <p:cTn id="20" fill="hold">
-                            <p:stCondLst>
-                              <p:cond delay="0"/>
-                            </p:stCondLst>
-                            <p:childTnLst>
                               <p:par>
-                                <p:cTn id="21" presetID="1" presetClass="entr" presetSubtype="0" fill="hold" grpId="0" nodeType="clickEffect">
+                                <p:cTn id="19" presetID="1" presetClass="entr" presetSubtype="0" fill="hold" grpId="0" nodeType="withEffect">
                                   <p:stCondLst>
                                     <p:cond delay="0"/>
                                   </p:stCondLst>
                                   <p:childTnLst>
                                     <p:set>
                                       <p:cBhvr>
-                                        <p:cTn id="22" dur="1" fill="hold">
+                                        <p:cTn id="20" dur="1" fill="hold">
                                           <p:stCondLst>
                                             <p:cond delay="0"/>
                                           </p:stCondLst>
@@ -19484,26 +18690,26 @@
                     </p:cTn>
                   </p:par>
                   <p:par>
-                    <p:cTn id="23" fill="hold">
+                    <p:cTn id="21" fill="hold">
                       <p:stCondLst>
                         <p:cond delay="indefinite"/>
                       </p:stCondLst>
                       <p:childTnLst>
                         <p:par>
-                          <p:cTn id="24" fill="hold">
+                          <p:cTn id="22" fill="hold">
                             <p:stCondLst>
                               <p:cond delay="0"/>
                             </p:stCondLst>
                             <p:childTnLst>
                               <p:par>
-                                <p:cTn id="25" presetID="1" presetClass="entr" presetSubtype="0" fill="hold" nodeType="clickEffect">
+                                <p:cTn id="23" presetID="1" presetClass="entr" presetSubtype="0" fill="hold" nodeType="clickEffect">
                                   <p:stCondLst>
                                     <p:cond delay="0"/>
                                   </p:stCondLst>
                                   <p:childTnLst>
                                     <p:set>
                                       <p:cBhvr>
-                                        <p:cTn id="26" dur="1" fill="hold">
+                                        <p:cTn id="24" dur="1" fill="hold">
                                           <p:stCondLst>
                                             <p:cond delay="0"/>
                                           </p:stCondLst>

</xml_diff>